<commit_message>
Fix: requirements.txt to streamlit
</commit_message>
<xml_diff>
--- a/1.Gabriel_Nobre_Apresentacao.pptx
+++ b/1.Gabriel_Nobre_Apresentacao.pptx
@@ -296,7 +296,7 @@
           <a:p>
             <a:fld id="{2D50022D-DF87-4158-A9CF-191769239C73}" type="datetimeFigureOut">
               <a:rPr lang="pt-BR" smtClean="0"/>
-              <a:t>13/12/2023</a:t>
+              <a:t>14/12/2023</a:t>
             </a:fld>
             <a:endParaRPr lang="pt-BR"/>
           </a:p>
@@ -494,7 +494,7 @@
           <a:p>
             <a:fld id="{2D50022D-DF87-4158-A9CF-191769239C73}" type="datetimeFigureOut">
               <a:rPr lang="pt-BR" smtClean="0"/>
-              <a:t>13/12/2023</a:t>
+              <a:t>14/12/2023</a:t>
             </a:fld>
             <a:endParaRPr lang="pt-BR"/>
           </a:p>
@@ -702,7 +702,7 @@
           <a:p>
             <a:fld id="{2D50022D-DF87-4158-A9CF-191769239C73}" type="datetimeFigureOut">
               <a:rPr lang="pt-BR" smtClean="0"/>
-              <a:t>13/12/2023</a:t>
+              <a:t>14/12/2023</a:t>
             </a:fld>
             <a:endParaRPr lang="pt-BR"/>
           </a:p>
@@ -900,7 +900,7 @@
           <a:p>
             <a:fld id="{2D50022D-DF87-4158-A9CF-191769239C73}" type="datetimeFigureOut">
               <a:rPr lang="pt-BR" smtClean="0"/>
-              <a:t>13/12/2023</a:t>
+              <a:t>14/12/2023</a:t>
             </a:fld>
             <a:endParaRPr lang="pt-BR"/>
           </a:p>
@@ -1175,7 +1175,7 @@
           <a:p>
             <a:fld id="{2D50022D-DF87-4158-A9CF-191769239C73}" type="datetimeFigureOut">
               <a:rPr lang="pt-BR" smtClean="0"/>
-              <a:t>13/12/2023</a:t>
+              <a:t>14/12/2023</a:t>
             </a:fld>
             <a:endParaRPr lang="pt-BR"/>
           </a:p>
@@ -1440,7 +1440,7 @@
           <a:p>
             <a:fld id="{2D50022D-DF87-4158-A9CF-191769239C73}" type="datetimeFigureOut">
               <a:rPr lang="pt-BR" smtClean="0"/>
-              <a:t>13/12/2023</a:t>
+              <a:t>14/12/2023</a:t>
             </a:fld>
             <a:endParaRPr lang="pt-BR"/>
           </a:p>
@@ -1852,7 +1852,7 @@
           <a:p>
             <a:fld id="{2D50022D-DF87-4158-A9CF-191769239C73}" type="datetimeFigureOut">
               <a:rPr lang="pt-BR" smtClean="0"/>
-              <a:t>13/12/2023</a:t>
+              <a:t>14/12/2023</a:t>
             </a:fld>
             <a:endParaRPr lang="pt-BR"/>
           </a:p>
@@ -1993,7 +1993,7 @@
           <a:p>
             <a:fld id="{2D50022D-DF87-4158-A9CF-191769239C73}" type="datetimeFigureOut">
               <a:rPr lang="pt-BR" smtClean="0"/>
-              <a:t>13/12/2023</a:t>
+              <a:t>14/12/2023</a:t>
             </a:fld>
             <a:endParaRPr lang="pt-BR"/>
           </a:p>
@@ -2106,7 +2106,7 @@
           <a:p>
             <a:fld id="{2D50022D-DF87-4158-A9CF-191769239C73}" type="datetimeFigureOut">
               <a:rPr lang="pt-BR" smtClean="0"/>
-              <a:t>13/12/2023</a:t>
+              <a:t>14/12/2023</a:t>
             </a:fld>
             <a:endParaRPr lang="pt-BR"/>
           </a:p>
@@ -2417,7 +2417,7 @@
           <a:p>
             <a:fld id="{2D50022D-DF87-4158-A9CF-191769239C73}" type="datetimeFigureOut">
               <a:rPr lang="pt-BR" smtClean="0"/>
-              <a:t>13/12/2023</a:t>
+              <a:t>14/12/2023</a:t>
             </a:fld>
             <a:endParaRPr lang="pt-BR"/>
           </a:p>
@@ -2705,7 +2705,7 @@
           <a:p>
             <a:fld id="{2D50022D-DF87-4158-A9CF-191769239C73}" type="datetimeFigureOut">
               <a:rPr lang="pt-BR" smtClean="0"/>
-              <a:t>13/12/2023</a:t>
+              <a:t>14/12/2023</a:t>
             </a:fld>
             <a:endParaRPr lang="pt-BR"/>
           </a:p>
@@ -2946,7 +2946,7 @@
           <a:p>
             <a:fld id="{2D50022D-DF87-4158-A9CF-191769239C73}" type="datetimeFigureOut">
               <a:rPr lang="pt-BR" smtClean="0"/>
-              <a:t>13/12/2023</a:t>
+              <a:t>14/12/2023</a:t>
             </a:fld>
             <a:endParaRPr lang="pt-BR"/>
           </a:p>
@@ -6293,10 +6293,10 @@
       </p:sp>
       <p:pic>
         <p:nvPicPr>
-          <p:cNvPr id="7" name="Imagem 6">
-            <a:extLst>
-              <a:ext uri="{FF2B5EF4-FFF2-40B4-BE49-F238E27FC236}">
-                <a16:creationId xmlns:a16="http://schemas.microsoft.com/office/drawing/2014/main" id="{CF78A882-E4B5-4989-97FB-6DEE64312AB1}"/>
+          <p:cNvPr id="9" name="Imagem 8">
+            <a:extLst>
+              <a:ext uri="{FF2B5EF4-FFF2-40B4-BE49-F238E27FC236}">
+                <a16:creationId xmlns:a16="http://schemas.microsoft.com/office/drawing/2014/main" id="{702D4E2F-4A44-FBC4-2B24-480DE1C9B88C}"/>
               </a:ext>
             </a:extLst>
           </p:cNvPr>
@@ -6313,8 +6313,8 @@
         </p:blipFill>
         <p:spPr>
           <a:xfrm>
-            <a:off x="2054817" y="3698267"/>
-            <a:ext cx="7497221" cy="2838846"/>
+            <a:off x="2169541" y="3698267"/>
+            <a:ext cx="7411484" cy="2924583"/>
           </a:xfrm>
           <a:prstGeom prst="rect">
             <a:avLst/>

</xml_diff>